<commit_message>
updating files for week 3
</commit_message>
<xml_diff>
--- a/lectures/ex1_intro_to_R.pptx
+++ b/lectures/ex1_intro_to_R.pptx
@@ -114,6 +114,11 @@
       </a:defRPr>
     </a:lvl9pPr>
   </p:defaultTextStyle>
+  <p:extLst>
+    <p:ext uri="{EFAFB233-063F-42B5-8137-9DF3F51BA10A}">
+      <p15:sldGuideLst xmlns:p15="http://schemas.microsoft.com/office/powerpoint/2012/main"/>
+    </p:ext>
+  </p:extLst>
 </p:presentation>
 </file>
 
@@ -199,7 +204,7 @@
           <a:p>
             <a:fld id="{E3F55388-6A8F-1341-9D1E-B023B27BE3D5}" type="datetimeFigureOut">
               <a:rPr lang="en-US" smtClean="0"/>
-              <a:t>1/24/19</a:t>
+              <a:t>1/22/20</a:t>
             </a:fld>
             <a:endParaRPr lang="en-US"/>
           </a:p>
@@ -697,7 +702,7 @@
           <a:p>
             <a:fld id="{FA0BDF2A-8048-BB44-864C-819C200F781C}" type="datetimeFigureOut">
               <a:rPr lang="en-US" smtClean="0"/>
-              <a:t>1/24/19</a:t>
+              <a:t>1/22/20</a:t>
             </a:fld>
             <a:endParaRPr lang="en-US"/>
           </a:p>
@@ -895,7 +900,7 @@
           <a:p>
             <a:fld id="{FA0BDF2A-8048-BB44-864C-819C200F781C}" type="datetimeFigureOut">
               <a:rPr lang="en-US" smtClean="0"/>
-              <a:t>1/24/19</a:t>
+              <a:t>1/22/20</a:t>
             </a:fld>
             <a:endParaRPr lang="en-US"/>
           </a:p>
@@ -1103,7 +1108,7 @@
           <a:p>
             <a:fld id="{FA0BDF2A-8048-BB44-864C-819C200F781C}" type="datetimeFigureOut">
               <a:rPr lang="en-US" smtClean="0"/>
-              <a:t>1/24/19</a:t>
+              <a:t>1/22/20</a:t>
             </a:fld>
             <a:endParaRPr lang="en-US"/>
           </a:p>
@@ -1301,7 +1306,7 @@
           <a:p>
             <a:fld id="{FA0BDF2A-8048-BB44-864C-819C200F781C}" type="datetimeFigureOut">
               <a:rPr lang="en-US" smtClean="0"/>
-              <a:t>1/24/19</a:t>
+              <a:t>1/22/20</a:t>
             </a:fld>
             <a:endParaRPr lang="en-US"/>
           </a:p>
@@ -1576,7 +1581,7 @@
           <a:p>
             <a:fld id="{FA0BDF2A-8048-BB44-864C-819C200F781C}" type="datetimeFigureOut">
               <a:rPr lang="en-US" smtClean="0"/>
-              <a:t>1/24/19</a:t>
+              <a:t>1/22/20</a:t>
             </a:fld>
             <a:endParaRPr lang="en-US"/>
           </a:p>
@@ -1841,7 +1846,7 @@
           <a:p>
             <a:fld id="{FA0BDF2A-8048-BB44-864C-819C200F781C}" type="datetimeFigureOut">
               <a:rPr lang="en-US" smtClean="0"/>
-              <a:t>1/24/19</a:t>
+              <a:t>1/22/20</a:t>
             </a:fld>
             <a:endParaRPr lang="en-US"/>
           </a:p>
@@ -2253,7 +2258,7 @@
           <a:p>
             <a:fld id="{FA0BDF2A-8048-BB44-864C-819C200F781C}" type="datetimeFigureOut">
               <a:rPr lang="en-US" smtClean="0"/>
-              <a:t>1/24/19</a:t>
+              <a:t>1/22/20</a:t>
             </a:fld>
             <a:endParaRPr lang="en-US"/>
           </a:p>
@@ -2394,7 +2399,7 @@
           <a:p>
             <a:fld id="{FA0BDF2A-8048-BB44-864C-819C200F781C}" type="datetimeFigureOut">
               <a:rPr lang="en-US" smtClean="0"/>
-              <a:t>1/24/19</a:t>
+              <a:t>1/22/20</a:t>
             </a:fld>
             <a:endParaRPr lang="en-US"/>
           </a:p>
@@ -2507,7 +2512,7 @@
           <a:p>
             <a:fld id="{FA0BDF2A-8048-BB44-864C-819C200F781C}" type="datetimeFigureOut">
               <a:rPr lang="en-US" smtClean="0"/>
-              <a:t>1/24/19</a:t>
+              <a:t>1/22/20</a:t>
             </a:fld>
             <a:endParaRPr lang="en-US"/>
           </a:p>
@@ -2818,7 +2823,7 @@
           <a:p>
             <a:fld id="{FA0BDF2A-8048-BB44-864C-819C200F781C}" type="datetimeFigureOut">
               <a:rPr lang="en-US" smtClean="0"/>
-              <a:t>1/24/19</a:t>
+              <a:t>1/22/20</a:t>
             </a:fld>
             <a:endParaRPr lang="en-US"/>
           </a:p>
@@ -3106,7 +3111,7 @@
           <a:p>
             <a:fld id="{FA0BDF2A-8048-BB44-864C-819C200F781C}" type="datetimeFigureOut">
               <a:rPr lang="en-US" smtClean="0"/>
-              <a:t>1/24/19</a:t>
+              <a:t>1/22/20</a:t>
             </a:fld>
             <a:endParaRPr lang="en-US"/>
           </a:p>
@@ -3347,7 +3352,7 @@
           <a:p>
             <a:fld id="{FA0BDF2A-8048-BB44-864C-819C200F781C}" type="datetimeFigureOut">
               <a:rPr lang="en-US" smtClean="0"/>
-              <a:t>1/24/19</a:t>
+              <a:t>1/22/20</a:t>
             </a:fld>
             <a:endParaRPr lang="en-US"/>
           </a:p>
@@ -4432,7 +4437,7 @@
         <p:spPr/>
         <p:txBody>
           <a:bodyPr>
-            <a:normAutofit fontScale="92500" lnSpcReduction="10000"/>
+            <a:normAutofit lnSpcReduction="10000"/>
           </a:bodyPr>
           <a:lstStyle/>
           <a:p>
@@ -4462,19 +4467,19 @@
           <a:p>
             <a:r>
               <a:rPr lang="en-US" dirty="0"/>
-              <a:t>if you’re on </a:t>
+              <a:t>if you’re on MacOS, it would be helpful to install </a:t>
             </a:r>
             <a:r>
               <a:rPr lang="en-US" dirty="0" err="1"/>
-              <a:t>MacOS</a:t>
-            </a:r>
-            <a:r>
-              <a:rPr lang="en-US" dirty="0"/>
-              <a:t>, it would be helpful to install </a:t>
+              <a:t>Xcode</a:t>
+            </a:r>
+            <a:r>
+              <a:rPr lang="en-US" dirty="0"/>
+              <a:t> and </a:t>
             </a:r>
             <a:r>
               <a:rPr lang="en-US" dirty="0" err="1"/>
-              <a:t>XCode</a:t>
+              <a:t>XQuartz</a:t>
             </a:r>
             <a:r>
               <a:rPr lang="en-US" dirty="0"/>
@@ -4520,11 +4525,8 @@
               <a:rPr lang="en-US" u="sng" dirty="0">
                 <a:hlinkClick r:id="rId3"/>
               </a:rPr>
-              <a:t>http://happygitwithr.com/install-git.html#install-git (Links to an external site.)Links to an external site.</a:t>
-            </a:r>
-            <a:endParaRPr lang="en-US" dirty="0"/>
-          </a:p>
-          <a:p>
+              <a:t>http://happygitwithr.com/install-git.html#install-git </a:t>
+            </a:r>
             <a:endParaRPr lang="en-US" dirty="0"/>
           </a:p>
           <a:p>
@@ -4790,7 +4792,7 @@
         </p:spPr>
         <p:txBody>
           <a:bodyPr>
-            <a:normAutofit fontScale="55000" lnSpcReduction="20000"/>
+            <a:normAutofit fontScale="47500" lnSpcReduction="20000"/>
           </a:bodyPr>
           <a:lstStyle/>
           <a:p>
@@ -4930,7 +4932,16 @@
             </a:pPr>
             <a:r>
               <a:rPr lang="en-US" dirty="0"/>
-              <a:t>Send in a paragraph describing your data. You can copy and paste your output and summary tables into the file to provide some additional context. </a:t>
+              <a:t>5. Send in a paragraph describing your data. You can copy and paste your output and summary tables into the file to provide some additional context. </a:t>
+            </a:r>
+          </a:p>
+          <a:p>
+            <a:pPr marL="0" indent="0">
+              <a:buNone/>
+            </a:pPr>
+            <a:r>
+              <a:rPr lang="en-US" dirty="0"/>
+              <a:t>	- In this paragraph: Include a list of goals you would like to make for your dataset/thesis project. </a:t>
             </a:r>
           </a:p>
           <a:p>
@@ -4941,6 +4952,31 @@
               <a:rPr lang="en-US" i="1" dirty="0"/>
               <a:t>For more advanced R users:</a:t>
             </a:r>
+          </a:p>
+          <a:p>
+            <a:pPr marL="0" indent="0">
+              <a:buNone/>
+            </a:pPr>
+            <a:r>
+              <a:rPr lang="en-US" i="1" dirty="0"/>
+              <a:t>6. Using the </a:t>
+            </a:r>
+            <a:r>
+              <a:rPr lang="en-US" i="1" dirty="0" err="1"/>
+              <a:t>cheatsheets</a:t>
+            </a:r>
+            <a:r>
+              <a:rPr lang="en-US" i="1" dirty="0"/>
+              <a:t> on canvas, use </a:t>
+            </a:r>
+            <a:r>
+              <a:rPr lang="en-US" i="1" dirty="0" err="1"/>
+              <a:t>tidyverse</a:t>
+            </a:r>
+            <a:r>
+              <a:rPr lang="en-US" i="1" dirty="0"/>
+              <a:t> n() function and spread() or gather() paired with piping to make the same table I do with base R.</a:t>
+            </a:r>
             <a:endParaRPr lang="en-US" dirty="0"/>
           </a:p>
           <a:p>
@@ -4949,7 +4985,15 @@
             </a:pPr>
             <a:r>
               <a:rPr lang="en-US" dirty="0"/>
-              <a:t>Same as above, but using the officers package, output your tables into a word document (see the code in files for example with officer). Try something fancier than I have in my example and play around with table formatting.</a:t>
+              <a:t>7. Using the officers package, output your tables into a word document (see the code in files for example with officer). Try something fancier than I have in my example and play around with table formatting. If you have a mac, you will need </a:t>
+            </a:r>
+            <a:r>
+              <a:rPr lang="en-US" dirty="0" err="1"/>
+              <a:t>xquartz</a:t>
+            </a:r>
+            <a:r>
+              <a:rPr lang="en-US" dirty="0"/>
+              <a:t> to get officers to work. </a:t>
             </a:r>
           </a:p>
           <a:p>
@@ -4968,7 +5012,7 @@
             </a:pPr>
             <a:r>
               <a:rPr lang="en-US" dirty="0"/>
-              <a:t>All the steps above, but knit your document and send me the .html too. </a:t>
+              <a:t>8. All the steps above, but knit your document and send me the .html too. </a:t>
             </a:r>
           </a:p>
         </p:txBody>

</xml_diff>